<commit_message>
Done, it is playable
</commit_message>
<xml_diff>
--- a/Vectrex/projects/NeuroVector/manual/manual_template.pptx
+++ b/Vectrex/projects/NeuroVector/manual/manual_template.pptx
@@ -6237,7 +6237,7 @@
           <p:spPr>
             <a:xfrm>
               <a:off x="908720" y="4083575"/>
-              <a:ext cx="2016224" cy="415498"/>
+              <a:ext cx="2016224" cy="738664"/>
             </a:xfrm>
             <a:prstGeom prst="rect">
               <a:avLst/>
@@ -6258,7 +6258,7 @@
             <a:p>
               <a:r>
                 <a:rPr lang="en-US" sz="1050" dirty="0"/>
-                <a:t>If stressed, press</a:t>
+                <a:t>Button 1 does nothing, but if you are stressed, you are free to press it</a:t>
               </a:r>
             </a:p>
           </p:txBody>
@@ -6513,7 +6513,7 @@
         <p:spPr>
           <a:xfrm>
             <a:off x="764704" y="1380946"/>
-            <a:ext cx="5328592" cy="6247864"/>
+            <a:ext cx="5328592" cy="5324535"/>
           </a:xfrm>
           <a:prstGeom prst="rect">
             <a:avLst/>
@@ -6534,11 +6534,8 @@
           <a:p>
             <a:r>
               <a:rPr lang="en-US" sz="1200" dirty="0"/>
-              <a:t>Conceptually, this game is a single player game, therefore only one player can play this game at a time and you do not need set anything. But if you have a friend right now, that is no problem. Just play the game in turns and look who can reach a higher score. </a:t>
-            </a:r>
-          </a:p>
-          <a:p>
-            <a:endParaRPr lang="en-US" sz="1200" dirty="0"/>
+              <a:t>This game is designed as a single-player experience, so only one player can play at a time. There are no additional player settings. If you have a friend with you, you can simply take turns and see who achieves the higher score.</a:t>
+            </a:r>
           </a:p>
           <a:p>
             <a:endParaRPr lang="en-US" sz="1200" dirty="0"/>
@@ -6553,11 +6550,8 @@
           <a:p>
             <a:r>
               <a:rPr lang="en-US" sz="1200" dirty="0"/>
-              <a:t>At the start of each game, after a short introduction, you arrive at the main menu. Here you can select between different game modes/options. There are in total 5 game modes:</a:t>
-            </a:r>
-          </a:p>
-          <a:p>
-            <a:endParaRPr lang="en-US" sz="1200" dirty="0"/>
+              <a:t>At the start of each game, after a brief introduction, you will arrive at the main menu. Here, you can choose from five different game modes:</a:t>
+            </a:r>
           </a:p>
           <a:p>
             <a:r>
@@ -6599,7 +6593,25 @@
           <a:p>
             <a:r>
               <a:rPr lang="en-US" sz="1200" dirty="0"/>
-              <a:t>A small arrow on the left of the screen indicates the currently selected mode. When the game is booted for the first time, the mode “STILL” is selected. You can navigate through the modes using the joystick. To move the arrow down, push the joystick downward. To continue going down, you need to release the pressure of the joystick and then reapply the pressure in which way(down or up) you like to move.</a:t>
+              <a:t>A small arrow on the left side of the screen indicates the currently selected mode. The first time the game is launched, the default mode is </a:t>
+            </a:r>
+            <a:r>
+              <a:rPr lang="en-US" sz="1200" b="1" dirty="0"/>
+              <a:t>STILL</a:t>
+            </a:r>
+            <a:r>
+              <a:rPr lang="en-US" sz="1200" dirty="0"/>
+              <a:t>.</a:t>
+            </a:r>
+          </a:p>
+          <a:p>
+            <a:r>
+              <a:rPr lang="en-US" sz="1200" dirty="0"/>
+              <a:t>You can navigate between the modes using the joystick. Push the joystick downward to move the arrow down. To continue moving in the same direction, release the joystick and then push it again in the desired direction (up or </a:t>
+            </a:r>
+            <a:r>
+              <a:rPr lang="en-US" sz="1200"/>
+              <a:t>down).</a:t>
             </a:r>
           </a:p>
           <a:p>
@@ -6608,7 +6620,15 @@
           <a:p>
             <a:r>
               <a:rPr lang="en-US" sz="1200" dirty="0"/>
-              <a:t>On the right side of the screen, your current high score for the selected mode is displayed. A mode is considered completed when you reach a score of 16.</a:t>
+              <a:t>On the right side of the screen, you can see your current high score for the selected mode. A mode is considered </a:t>
+            </a:r>
+            <a:r>
+              <a:rPr lang="en-US" sz="1200" b="1" dirty="0"/>
+              <a:t>completed</a:t>
+            </a:r>
+            <a:r>
+              <a:rPr lang="en-US" sz="1200" dirty="0"/>
+              <a:t> when you reach a score of 16.</a:t>
             </a:r>
           </a:p>
           <a:p>
@@ -6617,7 +6637,15 @@
           <a:p>
             <a:r>
               <a:rPr lang="en-US" sz="1200" dirty="0"/>
-              <a:t>To select a mode, press button 4 and you will be immediately thrown into the level. Do not worry, if you dislike a mode, there is still the option to go back to menu and select a different mode.</a:t>
+              <a:t>To select a mode, press </a:t>
+            </a:r>
+            <a:r>
+              <a:rPr lang="en-US" sz="1200" b="1" dirty="0"/>
+              <a:t>Button 4</a:t>
+            </a:r>
+            <a:r>
+              <a:rPr lang="en-US" sz="1200" dirty="0"/>
+              <a:t>. You will immediately enter the level. If you decide you don’t like the mode, you can return to the menu and select a different one.</a:t>
             </a:r>
           </a:p>
         </p:txBody>

</xml_diff>